<commit_message>
Uploading up-to-date ERD and PowerPoint with this included.
</commit_message>
<xml_diff>
--- a/Presentation Files/AlphaTeam-MoffatBayPresentation.pptx
+++ b/Presentation Files/AlphaTeam-MoffatBayPresentation.pptx
@@ -348,7 +348,7 @@
           <a:p>
             <a:fld id="{3152FF84-7013-4F2C-9A23-FA3E790B0CA9}" type="datetimeFigureOut">
               <a:rPr lang="en-US" smtClean="0"/>
-              <a:t>5/7/2025</a:t>
+              <a:t>5/9/2025</a:t>
             </a:fld>
             <a:endParaRPr lang="en-US"/>
           </a:p>
@@ -561,7 +561,7 @@
           <a:p>
             <a:fld id="{3152FF84-7013-4F2C-9A23-FA3E790B0CA9}" type="datetimeFigureOut">
               <a:rPr lang="en-US" smtClean="0"/>
-              <a:t>5/7/2025</a:t>
+              <a:t>5/9/2025</a:t>
             </a:fld>
             <a:endParaRPr lang="en-US"/>
           </a:p>
@@ -736,7 +736,7 @@
           <a:p>
             <a:fld id="{3152FF84-7013-4F2C-9A23-FA3E790B0CA9}" type="datetimeFigureOut">
               <a:rPr lang="en-US" smtClean="0"/>
-              <a:t>5/7/2025</a:t>
+              <a:t>5/9/2025</a:t>
             </a:fld>
             <a:endParaRPr lang="en-US"/>
           </a:p>
@@ -901,7 +901,7 @@
           <a:p>
             <a:fld id="{3152FF84-7013-4F2C-9A23-FA3E790B0CA9}" type="datetimeFigureOut">
               <a:rPr lang="en-US" smtClean="0"/>
-              <a:t>5/7/2025</a:t>
+              <a:t>5/9/2025</a:t>
             </a:fld>
             <a:endParaRPr lang="en-US"/>
           </a:p>
@@ -1185,7 +1185,7 @@
           <a:p>
             <a:fld id="{3152FF84-7013-4F2C-9A23-FA3E790B0CA9}" type="datetimeFigureOut">
               <a:rPr lang="en-US" smtClean="0"/>
-              <a:t>5/7/2025</a:t>
+              <a:t>5/9/2025</a:t>
             </a:fld>
             <a:endParaRPr lang="en-US"/>
           </a:p>
@@ -1511,7 +1511,7 @@
           <a:p>
             <a:fld id="{3152FF84-7013-4F2C-9A23-FA3E790B0CA9}" type="datetimeFigureOut">
               <a:rPr lang="en-US" smtClean="0"/>
-              <a:t>5/7/2025</a:t>
+              <a:t>5/9/2025</a:t>
             </a:fld>
             <a:endParaRPr lang="en-US"/>
           </a:p>
@@ -1936,7 +1936,7 @@
           <a:p>
             <a:fld id="{3152FF84-7013-4F2C-9A23-FA3E790B0CA9}" type="datetimeFigureOut">
               <a:rPr lang="en-US" smtClean="0"/>
-              <a:t>5/7/2025</a:t>
+              <a:t>5/9/2025</a:t>
             </a:fld>
             <a:endParaRPr lang="en-US"/>
           </a:p>
@@ -2109,7 +2109,7 @@
           <a:p>
             <a:fld id="{3152FF84-7013-4F2C-9A23-FA3E790B0CA9}" type="datetimeFigureOut">
               <a:rPr lang="en-US" smtClean="0"/>
-              <a:t>5/7/2025</a:t>
+              <a:t>5/9/2025</a:t>
             </a:fld>
             <a:endParaRPr lang="en-US"/>
           </a:p>
@@ -2199,7 +2199,7 @@
           <a:p>
             <a:fld id="{3152FF84-7013-4F2C-9A23-FA3E790B0CA9}" type="datetimeFigureOut">
               <a:rPr lang="en-US" smtClean="0"/>
-              <a:t>5/7/2025</a:t>
+              <a:t>5/9/2025</a:t>
             </a:fld>
             <a:endParaRPr lang="en-US"/>
           </a:p>
@@ -2479,7 +2479,7 @@
           <a:p>
             <a:fld id="{3152FF84-7013-4F2C-9A23-FA3E790B0CA9}" type="datetimeFigureOut">
               <a:rPr lang="en-US" smtClean="0"/>
-              <a:t>5/7/2025</a:t>
+              <a:t>5/9/2025</a:t>
             </a:fld>
             <a:endParaRPr lang="en-US"/>
           </a:p>
@@ -2778,7 +2778,7 @@
           <a:p>
             <a:fld id="{3152FF84-7013-4F2C-9A23-FA3E790B0CA9}" type="datetimeFigureOut">
               <a:rPr lang="en-US" smtClean="0"/>
-              <a:t>5/7/2025</a:t>
+              <a:t>5/9/2025</a:t>
             </a:fld>
             <a:endParaRPr lang="en-US"/>
           </a:p>
@@ -2988,7 +2988,7 @@
           <a:p>
             <a:fld id="{3152FF84-7013-4F2C-9A23-FA3E790B0CA9}" type="datetimeFigureOut">
               <a:rPr lang="en-US" smtClean="0"/>
-              <a:t>5/7/2025</a:t>
+              <a:t>5/9/2025</a:t>
             </a:fld>
             <a:endParaRPr lang="en-US"/>
           </a:p>
@@ -3583,16 +3583,11 @@
               <a:rPr lang="en-US" sz="2000" dirty="0" smtClean="0"/>
               <a:t>Module 11</a:t>
             </a:r>
-            <a:endParaRPr lang="en-US" sz="2000" dirty="0" smtClean="0"/>
           </a:p>
           <a:p>
             <a:r>
               <a:rPr lang="en-US" sz="2000" dirty="0" smtClean="0"/>
-              <a:t>May</a:t>
-            </a:r>
-            <a:r>
-              <a:rPr lang="en-US" sz="2000" dirty="0" smtClean="0"/>
-              <a:t> 7, 2025</a:t>
+              <a:t>May 7, 2025</a:t>
             </a:r>
             <a:endParaRPr lang="en-US" sz="2000" dirty="0"/>
           </a:p>
@@ -3687,13 +3682,8 @@
             </a:pPr>
             <a:r>
               <a:rPr lang="en-US" dirty="0" smtClean="0"/>
-              <a:t>About Us Page Information Verification </a:t>
-            </a:r>
-            <a:r>
-              <a:rPr lang="en-US" dirty="0" smtClean="0"/>
-              <a:t>Test:</a:t>
-            </a:r>
-            <a:endParaRPr lang="en-US" dirty="0" smtClean="0"/>
+              <a:t>About Us Page Information Verification Test:</a:t>
+            </a:r>
           </a:p>
           <a:p>
             <a:r>
@@ -3710,11 +3700,7 @@
           <a:p>
             <a:r>
               <a:rPr lang="en-US" dirty="0" smtClean="0"/>
-              <a:t>This test involved verifying that all required information tha</a:t>
-            </a:r>
-            <a:r>
-              <a:rPr lang="en-US" dirty="0" smtClean="0"/>
-              <a:t>t the client required was present and the layout was correct.</a:t>
+              <a:t>This test involved verifying that all required information that the client required was present and the layout was correct.</a:t>
             </a:r>
           </a:p>
           <a:p>
@@ -3722,7 +3708,6 @@
               <a:rPr lang="en-US" dirty="0" smtClean="0"/>
               <a:t>This simple test passed with all information clearly displayed with no errors for the links as well as all text present &amp; legible.</a:t>
             </a:r>
-            <a:endParaRPr lang="en-US" dirty="0" smtClean="0"/>
           </a:p>
         </p:txBody>
       </p:sp>
@@ -3755,7 +3740,6 @@
               <a:rPr lang="en-US" dirty="0" smtClean="0"/>
               <a:t>Attractions Page Carousel Image Test:</a:t>
             </a:r>
-            <a:endParaRPr lang="en-US" dirty="0" smtClean="0"/>
           </a:p>
           <a:p>
             <a:r>
@@ -3814,13 +3798,13 @@
   <p:clrMapOvr>
     <a:masterClrMapping/>
   </p:clrMapOvr>
-  <mc:AlternateContent xmlns:mc="http://schemas.openxmlformats.org/markup-compatibility/2006">
-    <mc:Choice xmlns:p14="http://schemas.microsoft.com/office/powerpoint/2010/main" Requires="p14">
+  <mc:AlternateContent xmlns:mc="http://schemas.openxmlformats.org/markup-compatibility/2006" xmlns:p14="http://schemas.microsoft.com/office/powerpoint/2010/main">
+    <mc:Choice Requires="p14">
       <p:transition spd="slow" p14:dur="1200">
         <p14:flip dir="r"/>
       </p:transition>
     </mc:Choice>
-    <mc:Fallback>
+    <mc:Fallback xmlns="">
       <p:transition spd="slow">
         <p:fade/>
       </p:transition>
@@ -3924,7 +3908,6 @@
               <a:rPr lang="en-US" dirty="0" smtClean="0"/>
               <a:t>Without us implementing these later on debugging would have been much more difficult.</a:t>
             </a:r>
-            <a:endParaRPr lang="en-US" dirty="0" smtClean="0"/>
           </a:p>
         </p:txBody>
       </p:sp>
@@ -3938,13 +3921,13 @@
   <p:clrMapOvr>
     <a:masterClrMapping/>
   </p:clrMapOvr>
-  <mc:AlternateContent xmlns:mc="http://schemas.openxmlformats.org/markup-compatibility/2006">
-    <mc:Choice xmlns:p14="http://schemas.microsoft.com/office/powerpoint/2010/main" Requires="p14">
+  <mc:AlternateContent xmlns:mc="http://schemas.openxmlformats.org/markup-compatibility/2006" xmlns:p14="http://schemas.microsoft.com/office/powerpoint/2010/main">
+    <mc:Choice Requires="p14">
       <p:transition spd="slow" p14:dur="3900">
         <p14:glitter pattern="hexagon"/>
       </p:transition>
     </mc:Choice>
-    <mc:Fallback>
+    <mc:Fallback xmlns="">
       <p:transition spd="slow">
         <p:fade/>
       </p:transition>
@@ -4055,7 +4038,6 @@
               <a:rPr lang="en-US" dirty="0" smtClean="0"/>
               <a:t>The key is empathy and adjustments by the involved members and the group as a whole for overall success.</a:t>
             </a:r>
-            <a:endParaRPr lang="en-US" dirty="0" smtClean="0"/>
           </a:p>
         </p:txBody>
       </p:sp>
@@ -4069,13 +4051,13 @@
   <p:clrMapOvr>
     <a:masterClrMapping/>
   </p:clrMapOvr>
-  <mc:AlternateContent xmlns:mc="http://schemas.openxmlformats.org/markup-compatibility/2006">
-    <mc:Choice xmlns:p14="http://schemas.microsoft.com/office/powerpoint/2010/main" Requires="p14">
+  <mc:AlternateContent xmlns:mc="http://schemas.openxmlformats.org/markup-compatibility/2006" xmlns:p14="http://schemas.microsoft.com/office/powerpoint/2010/main">
+    <mc:Choice Requires="p14">
       <p:transition spd="slow" p14:dur="2500">
         <p:checker/>
       </p:transition>
     </mc:Choice>
-    <mc:Fallback>
+    <mc:Fallback xmlns="">
       <p:transition spd="slow">
         <p:checker/>
       </p:transition>
@@ -4218,13 +4200,13 @@
   <p:clrMapOvr>
     <a:masterClrMapping/>
   </p:clrMapOvr>
-  <mc:AlternateContent xmlns:mc="http://schemas.openxmlformats.org/markup-compatibility/2006">
-    <mc:Choice xmlns:p14="http://schemas.microsoft.com/office/powerpoint/2010/main" Requires="p14">
+  <mc:AlternateContent xmlns:mc="http://schemas.openxmlformats.org/markup-compatibility/2006" xmlns:p14="http://schemas.microsoft.com/office/powerpoint/2010/main">
+    <mc:Choice Requires="p14">
       <p:transition spd="slow" p14:dur="1300">
         <p14:pan dir="u"/>
       </p:transition>
     </mc:Choice>
-    <mc:Fallback>
+    <mc:Fallback xmlns="">
       <p:transition spd="slow">
         <p:fade/>
       </p:transition>
@@ -4573,13 +4555,13 @@
   <p:clrMapOvr>
     <a:masterClrMapping/>
   </p:clrMapOvr>
-  <mc:AlternateContent xmlns:mc="http://schemas.openxmlformats.org/markup-compatibility/2006">
-    <mc:Choice xmlns:p14="http://schemas.microsoft.com/office/powerpoint/2010/main" Requires="p14">
+  <mc:AlternateContent xmlns:mc="http://schemas.openxmlformats.org/markup-compatibility/2006" xmlns:p14="http://schemas.microsoft.com/office/powerpoint/2010/main">
+    <mc:Choice Requires="p14">
       <p:transition spd="slow" p14:dur="1600">
         <p14:prism isInverted="1"/>
       </p:transition>
     </mc:Choice>
-    <mc:Fallback>
+    <mc:Fallback xmlns="">
       <p:transition spd="slow">
         <p:fade/>
       </p:transition>
@@ -4864,13 +4846,13 @@
   <p:clrMapOvr>
     <a:masterClrMapping/>
   </p:clrMapOvr>
-  <mc:AlternateContent xmlns:mc="http://schemas.openxmlformats.org/markup-compatibility/2006">
-    <mc:Choice xmlns:p14="http://schemas.microsoft.com/office/powerpoint/2010/main" Requires="p14">
+  <mc:AlternateContent xmlns:mc="http://schemas.openxmlformats.org/markup-compatibility/2006" xmlns:p14="http://schemas.microsoft.com/office/powerpoint/2010/main">
+    <mc:Choice Requires="p14">
       <p:transition spd="slow" p14:dur="1400">
         <p14:ripple/>
       </p:transition>
     </mc:Choice>
-    <mc:Fallback>
+    <mc:Fallback xmlns="">
       <p:transition spd="slow">
         <p:fade/>
       </p:transition>
@@ -5091,13 +5073,13 @@
   <p:clrMapOvr>
     <a:masterClrMapping/>
   </p:clrMapOvr>
-  <mc:AlternateContent xmlns:mc="http://schemas.openxmlformats.org/markup-compatibility/2006">
-    <mc:Choice xmlns:p14="http://schemas.microsoft.com/office/powerpoint/2010/main" Requires="p14">
+  <mc:AlternateContent xmlns:mc="http://schemas.openxmlformats.org/markup-compatibility/2006" xmlns:p14="http://schemas.microsoft.com/office/powerpoint/2010/main">
+    <mc:Choice Requires="p14">
       <p:transition spd="slow" p14:dur="1600">
         <p:blinds dir="vert"/>
       </p:transition>
     </mc:Choice>
-    <mc:Fallback>
+    <mc:Fallback xmlns="">
       <p:transition spd="slow">
         <p:blinds dir="vert"/>
       </p:transition>
@@ -5179,7 +5161,6 @@
               <a:rPr lang="en-US" dirty="0" smtClean="0"/>
               <a:t>Below is our Landing Page where the experience all begins!</a:t>
             </a:r>
-            <a:endParaRPr lang="en-US" dirty="0" smtClean="0"/>
           </a:p>
         </p:txBody>
       </p:sp>
@@ -5257,13 +5238,13 @@
   <p:clrMapOvr>
     <a:masterClrMapping/>
   </p:clrMapOvr>
-  <mc:AlternateContent xmlns:mc="http://schemas.openxmlformats.org/markup-compatibility/2006">
-    <mc:Choice xmlns:p14="http://schemas.microsoft.com/office/powerpoint/2010/main" Requires="p14">
+  <mc:AlternateContent xmlns:mc="http://schemas.openxmlformats.org/markup-compatibility/2006" xmlns:p14="http://schemas.microsoft.com/office/powerpoint/2010/main">
+    <mc:Choice Requires="p14">
       <p:transition spd="slow" p14:dur="800">
         <p:circle/>
       </p:transition>
     </mc:Choice>
-    <mc:Fallback>
+    <mc:Fallback xmlns="">
       <p:transition spd="slow">
         <p:circle/>
       </p:transition>
@@ -5329,21 +5310,104 @@
             <p:ph idx="1"/>
           </p:nvPr>
         </p:nvSpPr>
-        <p:spPr/>
+        <p:spPr>
+          <a:xfrm>
+            <a:off x="762000" y="685800"/>
+            <a:ext cx="3200400" cy="3886200"/>
+          </a:xfrm>
+        </p:spPr>
         <p:txBody>
           <a:bodyPr anchor="t">
             <a:normAutofit/>
           </a:bodyPr>
           <a:lstStyle/>
           <a:p>
-            <a:r>
-              <a:rPr lang="en-US" dirty="0" smtClean="0"/>
-              <a:t>Our ERD represents the database that we used for the website. We had to modify it a few times in throughout the project. This is the final result of these changes.</a:t>
-            </a:r>
-            <a:endParaRPr lang="en-US" dirty="0" smtClean="0"/>
-          </a:p>
-        </p:txBody>
-      </p:sp>
+            <a:pPr marL="0" indent="0">
+              <a:buNone/>
+            </a:pPr>
+            <a:r>
+              <a:rPr lang="en-US" dirty="0" smtClean="0"/>
+              <a:t>Our ERD represents the database that we used for the website. We had to modify it a few </a:t>
+            </a:r>
+            <a:r>
+              <a:rPr lang="en-US" smtClean="0"/>
+              <a:t>times </a:t>
+            </a:r>
+            <a:r>
+              <a:rPr lang="en-US" smtClean="0"/>
+              <a:t>throughout </a:t>
+            </a:r>
+            <a:r>
+              <a:rPr lang="en-US" dirty="0" smtClean="0"/>
+              <a:t>the project. This is the final result of these changes.</a:t>
+            </a:r>
+          </a:p>
+        </p:txBody>
+      </p:sp>
+      <p:pic>
+        <p:nvPicPr>
+          <p:cNvPr id="1026" name="Picture 2"/>
+          <p:cNvPicPr>
+            <a:picLocks noChangeAspect="1" noChangeArrowheads="1"/>
+          </p:cNvPicPr>
+          <p:nvPr/>
+        </p:nvPicPr>
+        <p:blipFill>
+          <a:blip r:embed="rId2">
+            <a:extLst>
+              <a:ext uri="{28A0092B-C50C-407E-A947-70E740481C1C}">
+                <a14:useLocalDpi xmlns:a14="http://schemas.microsoft.com/office/drawing/2010/main" val="0"/>
+              </a:ext>
+            </a:extLst>
+          </a:blip>
+          <a:srcRect/>
+          <a:stretch>
+            <a:fillRect/>
+          </a:stretch>
+        </p:blipFill>
+        <p:spPr bwMode="auto">
+          <a:xfrm>
+            <a:off x="4114800" y="745375"/>
+            <a:ext cx="4308142" cy="5248101"/>
+          </a:xfrm>
+          <a:prstGeom prst="rect">
+            <a:avLst/>
+          </a:prstGeom>
+          <a:noFill/>
+          <a:ln>
+            <a:noFill/>
+          </a:ln>
+          <a:effectLst/>
+          <a:extLst>
+            <a:ext uri="{909E8E84-426E-40DD-AFC4-6F175D3DCCD1}">
+              <a14:hiddenFill xmlns:a14="http://schemas.microsoft.com/office/drawing/2010/main">
+                <a:solidFill>
+                  <a:schemeClr val="accent1"/>
+                </a:solidFill>
+              </a14:hiddenFill>
+            </a:ext>
+            <a:ext uri="{91240B29-F687-4F45-9708-019B960494DF}">
+              <a14:hiddenLine xmlns:a14="http://schemas.microsoft.com/office/drawing/2010/main" w="9525">
+                <a:solidFill>
+                  <a:schemeClr val="tx1"/>
+                </a:solidFill>
+                <a:miter lim="800000"/>
+                <a:headEnd/>
+                <a:tailEnd/>
+              </a14:hiddenLine>
+            </a:ext>
+            <a:ext uri="{AF507438-7753-43E0-B8FC-AC1667EBCBE1}">
+              <a14:hiddenEffects xmlns:a14="http://schemas.microsoft.com/office/drawing/2010/main">
+                <a:effectLst>
+                  <a:outerShdw dist="35921" dir="2700000" algn="ctr" rotWithShape="0">
+                    <a:schemeClr val="bg2"/>
+                  </a:outerShdw>
+                </a:effectLst>
+              </a14:hiddenEffects>
+            </a:ext>
+          </a:extLst>
+        </p:spPr>
+      </p:pic>
     </p:spTree>
     <p:extLst>
       <p:ext uri="{BB962C8B-B14F-4D97-AF65-F5344CB8AC3E}">
@@ -5354,13 +5418,13 @@
   <p:clrMapOvr>
     <a:masterClrMapping/>
   </p:clrMapOvr>
-  <mc:AlternateContent xmlns:mc="http://schemas.openxmlformats.org/markup-compatibility/2006">
-    <mc:Choice xmlns:p14="http://schemas.microsoft.com/office/powerpoint/2010/main" Requires="p14">
+  <mc:AlternateContent xmlns:mc="http://schemas.openxmlformats.org/markup-compatibility/2006" xmlns:p14="http://schemas.microsoft.com/office/powerpoint/2010/main">
+    <mc:Choice Requires="p14">
       <p:transition spd="slow" p14:dur="1600">
         <p14:conveyor dir="l"/>
       </p:transition>
     </mc:Choice>
-    <mc:Fallback>
+    <mc:Fallback xmlns="">
       <p:transition spd="slow">
         <p:fade/>
       </p:transition>
@@ -5447,7 +5511,6 @@
               <a:rPr lang="en-US" dirty="0" smtClean="0"/>
               <a:t>Landing Page Verification Test:</a:t>
             </a:r>
-            <a:endParaRPr lang="en-US" dirty="0" smtClean="0"/>
           </a:p>
           <a:p>
             <a:r>
@@ -5492,7 +5555,6 @@
               <a:rPr lang="en-US" dirty="0" smtClean="0"/>
               <a:t>Navigation to the unconstructed pages failed as they didn’t exist yet. </a:t>
             </a:r>
-            <a:endParaRPr lang="en-US" dirty="0" smtClean="0"/>
           </a:p>
         </p:txBody>
       </p:sp>
@@ -5525,7 +5587,6 @@
               <a:rPr lang="en-US" dirty="0" smtClean="0"/>
               <a:t>Login Page Successful Login Test:</a:t>
             </a:r>
-            <a:endParaRPr lang="en-US" dirty="0" smtClean="0"/>
           </a:p>
           <a:p>
             <a:r>
@@ -5569,13 +5630,13 @@
   <p:clrMapOvr>
     <a:masterClrMapping/>
   </p:clrMapOvr>
-  <mc:AlternateContent xmlns:mc="http://schemas.openxmlformats.org/markup-compatibility/2006">
-    <mc:Choice xmlns:p14="http://schemas.microsoft.com/office/powerpoint/2010/main" Requires="p14">
+  <mc:AlternateContent xmlns:mc="http://schemas.openxmlformats.org/markup-compatibility/2006" xmlns:p14="http://schemas.microsoft.com/office/powerpoint/2010/main">
+    <mc:Choice Requires="p14">
       <p:transition spd="slow" p14:dur="1600">
         <p14:gallery dir="l"/>
       </p:transition>
     </mc:Choice>
-    <mc:Fallback>
+    <mc:Fallback xmlns="">
       <p:transition spd="slow">
         <p:fade/>
       </p:transition>
@@ -5662,16 +5723,11 @@
               <a:rPr lang="en-US" dirty="0" smtClean="0"/>
               <a:t>Registration with Missing Information Test:</a:t>
             </a:r>
-            <a:endParaRPr lang="en-US" dirty="0" smtClean="0"/>
-          </a:p>
-          <a:p>
-            <a:r>
-              <a:rPr lang="en-US" dirty="0" smtClean="0"/>
-              <a:t>A very important test we devised involving checking user input and validating tha</a:t>
-            </a:r>
-            <a:r>
-              <a:rPr lang="en-US" dirty="0" smtClean="0"/>
-              <a:t>t all required information was given.</a:t>
+          </a:p>
+          <a:p>
+            <a:r>
+              <a:rPr lang="en-US" dirty="0" smtClean="0"/>
+              <a:t>A very important test we devised involving checking user input and validating that all required information was given.</a:t>
             </a:r>
           </a:p>
           <a:p>
@@ -5703,7 +5759,6 @@
               <a:rPr lang="en-US" dirty="0" smtClean="0"/>
               <a:t>This test passed upon testing as expected.</a:t>
             </a:r>
-            <a:endParaRPr lang="en-US" dirty="0" smtClean="0"/>
           </a:p>
         </p:txBody>
       </p:sp>
@@ -5736,7 +5791,6 @@
               <a:rPr lang="en-US" dirty="0" smtClean="0"/>
               <a:t>Verification of Booking Test:</a:t>
             </a:r>
-            <a:endParaRPr lang="en-US" dirty="0" smtClean="0"/>
           </a:p>
           <a:p>
             <a:r>
@@ -5774,13 +5828,13 @@
   <p:clrMapOvr>
     <a:masterClrMapping/>
   </p:clrMapOvr>
-  <mc:AlternateContent xmlns:mc="http://schemas.openxmlformats.org/markup-compatibility/2006">
-    <mc:Choice xmlns:p14="http://schemas.microsoft.com/office/powerpoint/2010/main" Requires="p14">
+  <mc:AlternateContent xmlns:mc="http://schemas.openxmlformats.org/markup-compatibility/2006" xmlns:p14="http://schemas.microsoft.com/office/powerpoint/2010/main">
+    <mc:Choice Requires="p14">
       <p:transition spd="slow" p14:dur="1100">
         <p14:switch dir="r"/>
       </p:transition>
     </mc:Choice>
-    <mc:Fallback>
+    <mc:Fallback xmlns="">
       <p:transition spd="slow">
         <p:fade/>
       </p:transition>

</xml_diff>